<commit_message>
Finished Data Mining hw02
</commit_message>
<xml_diff>
--- a/MSiA 411/hw05/MSiA_Assignment 4_handout.pptx
+++ b/MSiA 411/hw05/MSiA_Assignment 4_handout.pptx
@@ -20,14 +20,14 @@
   <p:notesSz cx="6858000" cy="9144000"/>
   <p:embeddedFontLst>
     <p:embeddedFont>
-      <p:font typeface="Gill Sans MT" panose="020B0604020202020204" charset="0"/>
+      <p:font typeface="Calibri" panose="020F0502020204030204" pitchFamily="34" charset="0"/>
       <p:regular r:id="rId10"/>
       <p:bold r:id="rId11"/>
       <p:italic r:id="rId12"/>
       <p:boldItalic r:id="rId13"/>
     </p:embeddedFont>
     <p:embeddedFont>
-      <p:font typeface="Calibri" panose="020F0502020204030204" pitchFamily="34" charset="0"/>
+      <p:font typeface="Gill Sans MT" panose="020B0604020202020204" charset="0"/>
       <p:regular r:id="rId14"/>
       <p:bold r:id="rId15"/>
       <p:italic r:id="rId16"/>
@@ -230,7 +230,7 @@
           <a:p>
             <a:fld id="{41464382-CAA2-47B7-8711-EF71A07B8D6F}" type="datetimeFigureOut">
               <a:rPr lang="en-US" smtClean="0"/>
-              <a:t>2/13/2023</a:t>
+              <a:t>2/16/2023</a:t>
             </a:fld>
             <a:endParaRPr lang="en-US"/>
           </a:p>
@@ -1454,7 +1454,7 @@
             <a:fld id="{1D8BD707-D9CF-40AE-B4C6-C98DA3205C09}" type="datetimeFigureOut">
               <a:rPr lang="en-US" smtClean="0"/>
               <a:pPr/>
-              <a:t>2/13/2023</a:t>
+              <a:t>2/16/2023</a:t>
             </a:fld>
             <a:endParaRPr lang="en-US"/>
           </a:p>
@@ -1619,7 +1619,7 @@
             <a:fld id="{1D8BD707-D9CF-40AE-B4C6-C98DA3205C09}" type="datetimeFigureOut">
               <a:rPr lang="en-US" smtClean="0"/>
               <a:pPr/>
-              <a:t>2/13/2023</a:t>
+              <a:t>2/16/2023</a:t>
             </a:fld>
             <a:endParaRPr lang="en-US"/>
           </a:p>
@@ -1794,7 +1794,7 @@
             <a:fld id="{1D8BD707-D9CF-40AE-B4C6-C98DA3205C09}" type="datetimeFigureOut">
               <a:rPr lang="en-US" smtClean="0"/>
               <a:pPr/>
-              <a:t>2/13/2023</a:t>
+              <a:t>2/16/2023</a:t>
             </a:fld>
             <a:endParaRPr lang="en-US"/>
           </a:p>
@@ -1959,7 +1959,7 @@
             <a:fld id="{1D8BD707-D9CF-40AE-B4C6-C98DA3205C09}" type="datetimeFigureOut">
               <a:rPr lang="en-US" smtClean="0"/>
               <a:pPr/>
-              <a:t>2/13/2023</a:t>
+              <a:t>2/16/2023</a:t>
             </a:fld>
             <a:endParaRPr lang="en-US"/>
           </a:p>
@@ -2201,7 +2201,7 @@
             <a:fld id="{1D8BD707-D9CF-40AE-B4C6-C98DA3205C09}" type="datetimeFigureOut">
               <a:rPr lang="en-US" smtClean="0"/>
               <a:pPr/>
-              <a:t>2/13/2023</a:t>
+              <a:t>2/16/2023</a:t>
             </a:fld>
             <a:endParaRPr lang="en-US"/>
           </a:p>
@@ -2483,7 +2483,7 @@
             <a:fld id="{1D8BD707-D9CF-40AE-B4C6-C98DA3205C09}" type="datetimeFigureOut">
               <a:rPr lang="en-US" smtClean="0"/>
               <a:pPr/>
-              <a:t>2/13/2023</a:t>
+              <a:t>2/16/2023</a:t>
             </a:fld>
             <a:endParaRPr lang="en-US"/>
           </a:p>
@@ -2899,7 +2899,7 @@
             <a:fld id="{1D8BD707-D9CF-40AE-B4C6-C98DA3205C09}" type="datetimeFigureOut">
               <a:rPr lang="en-US" smtClean="0"/>
               <a:pPr/>
-              <a:t>2/13/2023</a:t>
+              <a:t>2/16/2023</a:t>
             </a:fld>
             <a:endParaRPr lang="en-US"/>
           </a:p>
@@ -3013,7 +3013,7 @@
             <a:fld id="{1D8BD707-D9CF-40AE-B4C6-C98DA3205C09}" type="datetimeFigureOut">
               <a:rPr lang="en-US" smtClean="0"/>
               <a:pPr/>
-              <a:t>2/13/2023</a:t>
+              <a:t>2/16/2023</a:t>
             </a:fld>
             <a:endParaRPr lang="en-US"/>
           </a:p>
@@ -3105,7 +3105,7 @@
             <a:fld id="{1D8BD707-D9CF-40AE-B4C6-C98DA3205C09}" type="datetimeFigureOut">
               <a:rPr lang="en-US" smtClean="0"/>
               <a:pPr/>
-              <a:t>2/13/2023</a:t>
+              <a:t>2/16/2023</a:t>
             </a:fld>
             <a:endParaRPr lang="en-US"/>
           </a:p>
@@ -3377,7 +3377,7 @@
             <a:fld id="{1D8BD707-D9CF-40AE-B4C6-C98DA3205C09}" type="datetimeFigureOut">
               <a:rPr lang="en-US" smtClean="0"/>
               <a:pPr/>
-              <a:t>2/13/2023</a:t>
+              <a:t>2/16/2023</a:t>
             </a:fld>
             <a:endParaRPr lang="en-US"/>
           </a:p>
@@ -3626,7 +3626,7 @@
             <a:fld id="{1D8BD707-D9CF-40AE-B4C6-C98DA3205C09}" type="datetimeFigureOut">
               <a:rPr lang="en-US" smtClean="0"/>
               <a:pPr/>
-              <a:t>2/13/2023</a:t>
+              <a:t>2/16/2023</a:t>
             </a:fld>
             <a:endParaRPr lang="en-US"/>
           </a:p>
@@ -3834,7 +3834,7 @@
             <a:fld id="{1D8BD707-D9CF-40AE-B4C6-C98DA3205C09}" type="datetimeFigureOut">
               <a:rPr lang="en-US" smtClean="0"/>
               <a:pPr/>
-              <a:t>2/13/2023</a:t>
+              <a:t>2/16/2023</a:t>
             </a:fld>
             <a:endParaRPr lang="en-US"/>
           </a:p>
@@ -4210,7 +4210,7 @@
           <p:cNvPr id="20" name="Rectangle 19">
             <a:extLst>
               <a:ext uri="{FF2B5EF4-FFF2-40B4-BE49-F238E27FC236}">
-                <a16:creationId xmlns:a16="http://schemas.microsoft.com/office/drawing/2014/main" xmlns="" id="{8CB42945-3AD5-4612-836A-FC003D3FD7E1}"/>
+                <a16:creationId xmlns="" xmlns:a16="http://schemas.microsoft.com/office/drawing/2014/main" id="{8CB42945-3AD5-4612-836A-FC003D3FD7E1}"/>
               </a:ext>
             </a:extLst>
           </p:cNvPr>
@@ -4264,7 +4264,7 @@
           <p:cNvPr id="47" name="TextBox 46">
             <a:extLst>
               <a:ext uri="{FF2B5EF4-FFF2-40B4-BE49-F238E27FC236}">
-                <a16:creationId xmlns:a16="http://schemas.microsoft.com/office/drawing/2014/main" xmlns="" id="{B2164003-5AD3-4D73-81BC-411BB4361C50}"/>
+                <a16:creationId xmlns="" xmlns:a16="http://schemas.microsoft.com/office/drawing/2014/main" id="{B2164003-5AD3-4D73-81BC-411BB4361C50}"/>
               </a:ext>
             </a:extLst>
           </p:cNvPr>
@@ -4338,7 +4338,7 @@
           <p:cNvPr id="48" name="Straight Connector 47">
             <a:extLst>
               <a:ext uri="{FF2B5EF4-FFF2-40B4-BE49-F238E27FC236}">
-                <a16:creationId xmlns:a16="http://schemas.microsoft.com/office/drawing/2014/main" xmlns="" id="{C8536193-5CC5-45D9-92EA-40FAD17D0B6E}"/>
+                <a16:creationId xmlns="" xmlns:a16="http://schemas.microsoft.com/office/drawing/2014/main" id="{C8536193-5CC5-45D9-92EA-40FAD17D0B6E}"/>
               </a:ext>
             </a:extLst>
           </p:cNvPr>
@@ -4384,7 +4384,7 @@
           <p:cNvPr id="12" name="Straight Connector 11">
             <a:extLst>
               <a:ext uri="{FF2B5EF4-FFF2-40B4-BE49-F238E27FC236}">
-                <a16:creationId xmlns:a16="http://schemas.microsoft.com/office/drawing/2014/main" xmlns="" id="{AE4D85DC-2AF7-4524-AF7B-76C822BF8EF7}"/>
+                <a16:creationId xmlns="" xmlns:a16="http://schemas.microsoft.com/office/drawing/2014/main" id="{AE4D85DC-2AF7-4524-AF7B-76C822BF8EF7}"/>
               </a:ext>
             </a:extLst>
           </p:cNvPr>
@@ -4425,7 +4425,7 @@
           <p:cNvPr id="13" name="TextBox 12">
             <a:extLst>
               <a:ext uri="{FF2B5EF4-FFF2-40B4-BE49-F238E27FC236}">
-                <a16:creationId xmlns:a16="http://schemas.microsoft.com/office/drawing/2014/main" xmlns="" id="{8EE196A9-EE5D-4ED9-BAAE-E9F7F6336B6E}"/>
+                <a16:creationId xmlns="" xmlns:a16="http://schemas.microsoft.com/office/drawing/2014/main" id="{8EE196A9-EE5D-4ED9-BAAE-E9F7F6336B6E}"/>
               </a:ext>
             </a:extLst>
           </p:cNvPr>
@@ -4501,7 +4501,7 @@
           <p:cNvPr id="15" name="TextBox 14">
             <a:extLst>
               <a:ext uri="{FF2B5EF4-FFF2-40B4-BE49-F238E27FC236}">
-                <a16:creationId xmlns:a16="http://schemas.microsoft.com/office/drawing/2014/main" xmlns="" id="{F475EF02-C299-4E64-8C76-70D35420149D}"/>
+                <a16:creationId xmlns="" xmlns:a16="http://schemas.microsoft.com/office/drawing/2014/main" id="{F475EF02-C299-4E64-8C76-70D35420149D}"/>
               </a:ext>
             </a:extLst>
           </p:cNvPr>
@@ -4511,7 +4511,7 @@
         <p:spPr>
           <a:xfrm>
             <a:off x="3962399" y="6237863"/>
-            <a:ext cx="6248393" cy="3170099"/>
+            <a:ext cx="6248393" cy="3600986"/>
           </a:xfrm>
           <a:prstGeom prst="rect">
             <a:avLst/>
@@ -4558,13 +4558,31 @@
               <a:buChar char="o"/>
             </a:pPr>
             <a:r>
+              <a:rPr lang="en-US" sz="2800" smtClean="0">
+                <a:solidFill>
+                  <a:srgbClr val="46211A"/>
+                </a:solidFill>
+                <a:latin typeface="Gill Sans MT" panose="020B0502020104020203" pitchFamily="34" charset="0"/>
+              </a:rPr>
+              <a:t>A want/drive </a:t>
+            </a:r>
+            <a:r>
               <a:rPr lang="en-US" sz="2800" dirty="0" smtClean="0">
                 <a:solidFill>
                   <a:srgbClr val="46211A"/>
                 </a:solidFill>
                 <a:latin typeface="Gill Sans MT" panose="020B0502020104020203" pitchFamily="34" charset="0"/>
               </a:rPr>
-              <a:t>Initiate more volunteer projects outside of the United States</a:t>
+              <a:t>to initiate </a:t>
+            </a:r>
+            <a:r>
+              <a:rPr lang="en-US" sz="2800" dirty="0" smtClean="0">
+                <a:solidFill>
+                  <a:srgbClr val="46211A"/>
+                </a:solidFill>
+                <a:latin typeface="Gill Sans MT" panose="020B0502020104020203" pitchFamily="34" charset="0"/>
+              </a:rPr>
+              <a:t>more volunteer projects outside of the United States</a:t>
             </a:r>
             <a:endParaRPr lang="en-US" sz="2800" dirty="0">
               <a:solidFill>
@@ -4589,7 +4607,7 @@
           <p:cNvPr id="16" name="Picture 15">
             <a:extLst>
               <a:ext uri="{FF2B5EF4-FFF2-40B4-BE49-F238E27FC236}">
-                <a16:creationId xmlns:a16="http://schemas.microsoft.com/office/drawing/2014/main" xmlns="" id="{F25212C5-EA8B-4C75-BA13-AF4DAAED9666}"/>
+                <a16:creationId xmlns="" xmlns:a16="http://schemas.microsoft.com/office/drawing/2014/main" id="{F25212C5-EA8B-4C75-BA13-AF4DAAED9666}"/>
               </a:ext>
             </a:extLst>
           </p:cNvPr>
@@ -4660,7 +4678,7 @@
           <p:cNvPr id="2" name="Rectangle 1">
             <a:extLst>
               <a:ext uri="{FF2B5EF4-FFF2-40B4-BE49-F238E27FC236}">
-                <a16:creationId xmlns:a16="http://schemas.microsoft.com/office/drawing/2014/main" xmlns="" id="{A2CE80B0-1B87-41EF-8EC7-4D3C92010FD1}"/>
+                <a16:creationId xmlns="" xmlns:a16="http://schemas.microsoft.com/office/drawing/2014/main" id="{A2CE80B0-1B87-41EF-8EC7-4D3C92010FD1}"/>
               </a:ext>
             </a:extLst>
           </p:cNvPr>
@@ -4714,7 +4732,7 @@
           <p:cNvPr id="47" name="TextBox 46">
             <a:extLst>
               <a:ext uri="{FF2B5EF4-FFF2-40B4-BE49-F238E27FC236}">
-                <a16:creationId xmlns:a16="http://schemas.microsoft.com/office/drawing/2014/main" xmlns="" id="{B2164003-5AD3-4D73-81BC-411BB4361C50}"/>
+                <a16:creationId xmlns="" xmlns:a16="http://schemas.microsoft.com/office/drawing/2014/main" id="{B2164003-5AD3-4D73-81BC-411BB4361C50}"/>
               </a:ext>
             </a:extLst>
           </p:cNvPr>
@@ -4758,7 +4776,7 @@
           <p:cNvPr id="48" name="Straight Connector 47">
             <a:extLst>
               <a:ext uri="{FF2B5EF4-FFF2-40B4-BE49-F238E27FC236}">
-                <a16:creationId xmlns:a16="http://schemas.microsoft.com/office/drawing/2014/main" xmlns="" id="{C8536193-5CC5-45D9-92EA-40FAD17D0B6E}"/>
+                <a16:creationId xmlns="" xmlns:a16="http://schemas.microsoft.com/office/drawing/2014/main" id="{C8536193-5CC5-45D9-92EA-40FAD17D0B6E}"/>
               </a:ext>
             </a:extLst>
           </p:cNvPr>
@@ -4804,7 +4822,7 @@
           <p:cNvPr id="12" name="Straight Connector 11">
             <a:extLst>
               <a:ext uri="{FF2B5EF4-FFF2-40B4-BE49-F238E27FC236}">
-                <a16:creationId xmlns:a16="http://schemas.microsoft.com/office/drawing/2014/main" xmlns="" id="{AE4D85DC-2AF7-4524-AF7B-76C822BF8EF7}"/>
+                <a16:creationId xmlns="" xmlns:a16="http://schemas.microsoft.com/office/drawing/2014/main" id="{AE4D85DC-2AF7-4524-AF7B-76C822BF8EF7}"/>
               </a:ext>
             </a:extLst>
           </p:cNvPr>
@@ -4845,7 +4863,7 @@
           <p:cNvPr id="13" name="TextBox 12">
             <a:extLst>
               <a:ext uri="{FF2B5EF4-FFF2-40B4-BE49-F238E27FC236}">
-                <a16:creationId xmlns:a16="http://schemas.microsoft.com/office/drawing/2014/main" xmlns="" id="{8EE196A9-EE5D-4ED9-BAAE-E9F7F6336B6E}"/>
+                <a16:creationId xmlns="" xmlns:a16="http://schemas.microsoft.com/office/drawing/2014/main" id="{8EE196A9-EE5D-4ED9-BAAE-E9F7F6336B6E}"/>
               </a:ext>
             </a:extLst>
           </p:cNvPr>
@@ -4963,7 +4981,7 @@
           <p:cNvPr id="15" name="TextBox 14">
             <a:extLst>
               <a:ext uri="{FF2B5EF4-FFF2-40B4-BE49-F238E27FC236}">
-                <a16:creationId xmlns:a16="http://schemas.microsoft.com/office/drawing/2014/main" xmlns="" id="{F475EF02-C299-4E64-8C76-70D35420149D}"/>
+                <a16:creationId xmlns="" xmlns:a16="http://schemas.microsoft.com/office/drawing/2014/main" id="{F475EF02-C299-4E64-8C76-70D35420149D}"/>
               </a:ext>
             </a:extLst>
           </p:cNvPr>
@@ -5083,13 +5101,22 @@
               <a:buChar char="o"/>
             </a:pPr>
             <a:r>
+              <a:rPr lang="en-US" sz="2800" dirty="0">
+                <a:solidFill>
+                  <a:srgbClr val="46211A"/>
+                </a:solidFill>
+                <a:latin typeface="Gill Sans MT" panose="020B0502020104020203" pitchFamily="34" charset="0"/>
+              </a:rPr>
+              <a:t>1</a:t>
+            </a:r>
+            <a:r>
               <a:rPr lang="en-US" sz="2800" dirty="0" smtClean="0">
                 <a:solidFill>
                   <a:srgbClr val="46211A"/>
                 </a:solidFill>
                 <a:latin typeface="Gill Sans MT" panose="020B0502020104020203" pitchFamily="34" charset="0"/>
               </a:rPr>
-              <a:t>5 minutes</a:t>
+              <a:t> minute</a:t>
             </a:r>
             <a:endParaRPr lang="en-US" sz="2800" dirty="0">
               <a:solidFill>
@@ -5114,7 +5141,7 @@
           <p:cNvPr id="16" name="Picture 15">
             <a:extLst>
               <a:ext uri="{FF2B5EF4-FFF2-40B4-BE49-F238E27FC236}">
-                <a16:creationId xmlns:a16="http://schemas.microsoft.com/office/drawing/2014/main" xmlns="" id="{F25212C5-EA8B-4C75-BA13-AF4DAAED9666}"/>
+                <a16:creationId xmlns="" xmlns:a16="http://schemas.microsoft.com/office/drawing/2014/main" id="{F25212C5-EA8B-4C75-BA13-AF4DAAED9666}"/>
               </a:ext>
             </a:extLst>
           </p:cNvPr>
@@ -5185,7 +5212,7 @@
           <p:cNvPr id="4" name="Rectangle 3">
             <a:extLst>
               <a:ext uri="{FF2B5EF4-FFF2-40B4-BE49-F238E27FC236}">
-                <a16:creationId xmlns:a16="http://schemas.microsoft.com/office/drawing/2014/main" xmlns="" id="{38FCD5FB-0C64-4932-A290-F0A431DB4266}"/>
+                <a16:creationId xmlns="" xmlns:a16="http://schemas.microsoft.com/office/drawing/2014/main" id="{38FCD5FB-0C64-4932-A290-F0A431DB4266}"/>
               </a:ext>
             </a:extLst>
           </p:cNvPr>
@@ -5194,7 +5221,7 @@
         </p:nvSpPr>
         <p:spPr>
           <a:xfrm>
-            <a:off x="0" y="0"/>
+            <a:off x="0" y="25908"/>
             <a:ext cx="18287999" cy="10287000"/>
           </a:xfrm>
           <a:prstGeom prst="rect">
@@ -5239,7 +5266,7 @@
           <p:cNvPr id="47" name="TextBox 46">
             <a:extLst>
               <a:ext uri="{FF2B5EF4-FFF2-40B4-BE49-F238E27FC236}">
-                <a16:creationId xmlns:a16="http://schemas.microsoft.com/office/drawing/2014/main" xmlns="" id="{B2164003-5AD3-4D73-81BC-411BB4361C50}"/>
+                <a16:creationId xmlns="" xmlns:a16="http://schemas.microsoft.com/office/drawing/2014/main" id="{B2164003-5AD3-4D73-81BC-411BB4361C50}"/>
               </a:ext>
             </a:extLst>
           </p:cNvPr>
@@ -5283,7 +5310,7 @@
           <p:cNvPr id="48" name="Straight Connector 47">
             <a:extLst>
               <a:ext uri="{FF2B5EF4-FFF2-40B4-BE49-F238E27FC236}">
-                <a16:creationId xmlns:a16="http://schemas.microsoft.com/office/drawing/2014/main" xmlns="" id="{C8536193-5CC5-45D9-92EA-40FAD17D0B6E}"/>
+                <a16:creationId xmlns="" xmlns:a16="http://schemas.microsoft.com/office/drawing/2014/main" id="{C8536193-5CC5-45D9-92EA-40FAD17D0B6E}"/>
               </a:ext>
             </a:extLst>
           </p:cNvPr>
@@ -5329,7 +5356,7 @@
           <p:cNvPr id="12" name="Straight Connector 11">
             <a:extLst>
               <a:ext uri="{FF2B5EF4-FFF2-40B4-BE49-F238E27FC236}">
-                <a16:creationId xmlns:a16="http://schemas.microsoft.com/office/drawing/2014/main" xmlns="" id="{AE4D85DC-2AF7-4524-AF7B-76C822BF8EF7}"/>
+                <a16:creationId xmlns="" xmlns:a16="http://schemas.microsoft.com/office/drawing/2014/main" id="{AE4D85DC-2AF7-4524-AF7B-76C822BF8EF7}"/>
               </a:ext>
             </a:extLst>
           </p:cNvPr>
@@ -5370,7 +5397,7 @@
           <p:cNvPr id="13" name="TextBox 12">
             <a:extLst>
               <a:ext uri="{FF2B5EF4-FFF2-40B4-BE49-F238E27FC236}">
-                <a16:creationId xmlns:a16="http://schemas.microsoft.com/office/drawing/2014/main" xmlns="" id="{8EE196A9-EE5D-4ED9-BAAE-E9F7F6336B6E}"/>
+                <a16:creationId xmlns="" xmlns:a16="http://schemas.microsoft.com/office/drawing/2014/main" id="{8EE196A9-EE5D-4ED9-BAAE-E9F7F6336B6E}"/>
               </a:ext>
             </a:extLst>
           </p:cNvPr>
@@ -5458,7 +5485,7 @@
           <p:cNvPr id="15" name="TextBox 14">
             <a:extLst>
               <a:ext uri="{FF2B5EF4-FFF2-40B4-BE49-F238E27FC236}">
-                <a16:creationId xmlns:a16="http://schemas.microsoft.com/office/drawing/2014/main" xmlns="" id="{F475EF02-C299-4E64-8C76-70D35420149D}"/>
+                <a16:creationId xmlns="" xmlns:a16="http://schemas.microsoft.com/office/drawing/2014/main" id="{F475EF02-C299-4E64-8C76-70D35420149D}"/>
               </a:ext>
             </a:extLst>
           </p:cNvPr>
@@ -5468,7 +5495,7 @@
         <p:spPr>
           <a:xfrm>
             <a:off x="3962399" y="6237863"/>
-            <a:ext cx="6248393" cy="3170099"/>
+            <a:ext cx="7772401" cy="4893647"/>
           </a:xfrm>
           <a:prstGeom prst="rect">
             <a:avLst/>
@@ -5494,14 +5521,20 @@
               <a:buChar char="o"/>
             </a:pPr>
             <a:r>
-              <a:rPr lang="en-US" sz="2800" dirty="0">
+              <a:rPr lang="en-US" sz="2800" dirty="0" smtClean="0">
                 <a:solidFill>
                   <a:srgbClr val="BA5536"/>
                 </a:solidFill>
                 <a:latin typeface="Gill Sans MT" panose="020B0502020104020203" pitchFamily="34" charset="0"/>
               </a:rPr>
-              <a:t>[insert answer]</a:t>
-            </a:r>
+              <a:t>Name of charity, charity country, charity city, topic, date of project, name of volunteer,  volunteer country,  volunteer city, and URL</a:t>
+            </a:r>
+            <a:endParaRPr lang="en-US" sz="2800" dirty="0">
+              <a:solidFill>
+                <a:srgbClr val="BA5536"/>
+              </a:solidFill>
+              <a:latin typeface="Gill Sans MT" panose="020B0502020104020203" pitchFamily="34" charset="0"/>
+            </a:endParaRPr>
           </a:p>
           <a:p>
             <a:pPr marL="914400" lvl="1" indent="-457200">
@@ -5509,14 +5542,20 @@
               <a:buChar char="o"/>
             </a:pPr>
             <a:r>
-              <a:rPr lang="en-US" sz="2800" dirty="0">
+              <a:rPr lang="en-US" sz="2800" dirty="0" smtClean="0">
                 <a:solidFill>
                   <a:srgbClr val="BA5536"/>
                 </a:solidFill>
                 <a:latin typeface="Gill Sans MT" panose="020B0502020104020203" pitchFamily="34" charset="0"/>
               </a:rPr>
-              <a:t>[insert answer]</a:t>
-            </a:r>
+              <a:t>Small data, only 523 rows</a:t>
+            </a:r>
+            <a:endParaRPr lang="en-US" sz="2800" dirty="0">
+              <a:solidFill>
+                <a:srgbClr val="BA5536"/>
+              </a:solidFill>
+              <a:latin typeface="Gill Sans MT" panose="020B0502020104020203" pitchFamily="34" charset="0"/>
+            </a:endParaRPr>
           </a:p>
           <a:p>
             <a:pPr marL="914400" lvl="1" indent="-457200">
@@ -5524,29 +5563,20 @@
               <a:buChar char="o"/>
             </a:pPr>
             <a:r>
-              <a:rPr lang="en-US" sz="2800" dirty="0">
+              <a:rPr lang="en-US" sz="2800" dirty="0" smtClean="0">
                 <a:solidFill>
                   <a:srgbClr val="BA5536"/>
                 </a:solidFill>
                 <a:latin typeface="Gill Sans MT" panose="020B0502020104020203" pitchFamily="34" charset="0"/>
               </a:rPr>
-              <a:t>[insert answer]</a:t>
-            </a:r>
-          </a:p>
-          <a:p>
-            <a:pPr marL="914400" lvl="1" indent="-457200">
-              <a:buFont typeface="Courier New" panose="02070309020205020404" pitchFamily="49" charset="0"/>
-              <a:buChar char="o"/>
-            </a:pPr>
-            <a:r>
-              <a:rPr lang="en-US" sz="2800" dirty="0">
-                <a:solidFill>
-                  <a:srgbClr val="BA5536"/>
-                </a:solidFill>
-                <a:latin typeface="Gill Sans MT" panose="020B0502020104020203" pitchFamily="34" charset="0"/>
-              </a:rPr>
-              <a:t>[insert answer]</a:t>
-            </a:r>
+              <a:t>I considered looking at the counts of a lot of the variables. We can see where people are volunteering and where projects are being started</a:t>
+            </a:r>
+            <a:endParaRPr lang="en-US" sz="2800" dirty="0">
+              <a:solidFill>
+                <a:srgbClr val="BA5536"/>
+              </a:solidFill>
+              <a:latin typeface="Gill Sans MT" panose="020B0502020104020203" pitchFamily="34" charset="0"/>
+            </a:endParaRPr>
           </a:p>
           <a:p>
             <a:pPr marL="914400" lvl="1" indent="-457200">
@@ -5576,7 +5606,7 @@
           <p:cNvPr id="2" name="Picture 1">
             <a:extLst>
               <a:ext uri="{FF2B5EF4-FFF2-40B4-BE49-F238E27FC236}">
-                <a16:creationId xmlns:a16="http://schemas.microsoft.com/office/drawing/2014/main" xmlns="" id="{0A53CADC-0E68-41CE-B697-C7D960088DB1}"/>
+                <a16:creationId xmlns="" xmlns:a16="http://schemas.microsoft.com/office/drawing/2014/main" id="{0A53CADC-0E68-41CE-B697-C7D960088DB1}"/>
               </a:ext>
             </a:extLst>
           </p:cNvPr>
@@ -5647,7 +5677,7 @@
           <p:cNvPr id="5" name="Rectangle 4">
             <a:extLst>
               <a:ext uri="{FF2B5EF4-FFF2-40B4-BE49-F238E27FC236}">
-                <a16:creationId xmlns:a16="http://schemas.microsoft.com/office/drawing/2014/main" xmlns="" id="{A09E73EB-660B-43AD-92EC-763D8FF16D49}"/>
+                <a16:creationId xmlns="" xmlns:a16="http://schemas.microsoft.com/office/drawing/2014/main" id="{A09E73EB-660B-43AD-92EC-763D8FF16D49}"/>
               </a:ext>
             </a:extLst>
           </p:cNvPr>
@@ -5701,7 +5731,7 @@
           <p:cNvPr id="47" name="TextBox 46">
             <a:extLst>
               <a:ext uri="{FF2B5EF4-FFF2-40B4-BE49-F238E27FC236}">
-                <a16:creationId xmlns:a16="http://schemas.microsoft.com/office/drawing/2014/main" xmlns="" id="{B2164003-5AD3-4D73-81BC-411BB4361C50}"/>
+                <a16:creationId xmlns="" xmlns:a16="http://schemas.microsoft.com/office/drawing/2014/main" id="{B2164003-5AD3-4D73-81BC-411BB4361C50}"/>
               </a:ext>
             </a:extLst>
           </p:cNvPr>
@@ -5775,7 +5805,7 @@
           <p:cNvPr id="48" name="Straight Connector 47">
             <a:extLst>
               <a:ext uri="{FF2B5EF4-FFF2-40B4-BE49-F238E27FC236}">
-                <a16:creationId xmlns:a16="http://schemas.microsoft.com/office/drawing/2014/main" xmlns="" id="{C8536193-5CC5-45D9-92EA-40FAD17D0B6E}"/>
+                <a16:creationId xmlns="" xmlns:a16="http://schemas.microsoft.com/office/drawing/2014/main" id="{C8536193-5CC5-45D9-92EA-40FAD17D0B6E}"/>
               </a:ext>
             </a:extLst>
           </p:cNvPr>
@@ -5821,7 +5851,7 @@
           <p:cNvPr id="12" name="Straight Connector 11">
             <a:extLst>
               <a:ext uri="{FF2B5EF4-FFF2-40B4-BE49-F238E27FC236}">
-                <a16:creationId xmlns:a16="http://schemas.microsoft.com/office/drawing/2014/main" xmlns="" id="{AE4D85DC-2AF7-4524-AF7B-76C822BF8EF7}"/>
+                <a16:creationId xmlns="" xmlns:a16="http://schemas.microsoft.com/office/drawing/2014/main" id="{AE4D85DC-2AF7-4524-AF7B-76C822BF8EF7}"/>
               </a:ext>
             </a:extLst>
           </p:cNvPr>
@@ -5862,7 +5892,7 @@
           <p:cNvPr id="13" name="TextBox 12">
             <a:extLst>
               <a:ext uri="{FF2B5EF4-FFF2-40B4-BE49-F238E27FC236}">
-                <a16:creationId xmlns:a16="http://schemas.microsoft.com/office/drawing/2014/main" xmlns="" id="{8EE196A9-EE5D-4ED9-BAAE-E9F7F6336B6E}"/>
+                <a16:creationId xmlns="" xmlns:a16="http://schemas.microsoft.com/office/drawing/2014/main" id="{8EE196A9-EE5D-4ED9-BAAE-E9F7F6336B6E}"/>
               </a:ext>
             </a:extLst>
           </p:cNvPr>
@@ -5953,7 +5983,7 @@
           <p:cNvPr id="15" name="TextBox 14">
             <a:extLst>
               <a:ext uri="{FF2B5EF4-FFF2-40B4-BE49-F238E27FC236}">
-                <a16:creationId xmlns:a16="http://schemas.microsoft.com/office/drawing/2014/main" xmlns="" id="{F475EF02-C299-4E64-8C76-70D35420149D}"/>
+                <a16:creationId xmlns="" xmlns:a16="http://schemas.microsoft.com/office/drawing/2014/main" id="{F475EF02-C299-4E64-8C76-70D35420149D}"/>
               </a:ext>
             </a:extLst>
           </p:cNvPr>
@@ -5963,7 +5993,7 @@
         <p:spPr>
           <a:xfrm>
             <a:off x="3962399" y="6237863"/>
-            <a:ext cx="6248393" cy="1877437"/>
+            <a:ext cx="6248393" cy="3600986"/>
           </a:xfrm>
           <a:prstGeom prst="rect">
             <a:avLst/>
@@ -5980,7 +6010,13 @@
               <a:rPr lang="en-US" sz="3200" b="1" dirty="0">
                 <a:latin typeface="Gill Sans MT" panose="020B0502020104020203" pitchFamily="34" charset="0"/>
               </a:rPr>
-              <a:t>Your answers:</a:t>
+              <a:t>Your </a:t>
+            </a:r>
+            <a:r>
+              <a:rPr lang="en-US" sz="3200" b="1" dirty="0" smtClean="0">
+                <a:latin typeface="Gill Sans MT" panose="020B0502020104020203" pitchFamily="34" charset="0"/>
+              </a:rPr>
+              <a:t>answers:</a:t>
             </a:r>
           </a:p>
           <a:p>
@@ -5989,14 +6025,20 @@
               <a:buChar char="o"/>
             </a:pPr>
             <a:r>
-              <a:rPr lang="en-US" sz="2800" dirty="0">
+              <a:rPr lang="en-US" sz="2800" dirty="0" smtClean="0">
                 <a:solidFill>
                   <a:srgbClr val="BA5536"/>
                 </a:solidFill>
                 <a:latin typeface="Gill Sans MT" panose="020B0502020104020203" pitchFamily="34" charset="0"/>
               </a:rPr>
-              <a:t>[insert answer]</a:t>
-            </a:r>
+              <a:t>No data cleaning</a:t>
+            </a:r>
+            <a:endParaRPr lang="en-US" sz="2800" dirty="0">
+              <a:solidFill>
+                <a:srgbClr val="BA5536"/>
+              </a:solidFill>
+              <a:latin typeface="Gill Sans MT" panose="020B0502020104020203" pitchFamily="34" charset="0"/>
+            </a:endParaRPr>
           </a:p>
           <a:p>
             <a:pPr marL="914400" lvl="1" indent="-457200">
@@ -6004,14 +6046,38 @@
               <a:buChar char="o"/>
             </a:pPr>
             <a:r>
+              <a:rPr lang="en-US" sz="2800" dirty="0" smtClean="0">
+                <a:solidFill>
+                  <a:srgbClr val="BA5536"/>
+                </a:solidFill>
+                <a:latin typeface="Gill Sans MT" panose="020B0502020104020203" pitchFamily="34" charset="0"/>
+              </a:rPr>
+              <a:t>I had to make counts for different variables to be able </a:t>
+            </a:r>
+            <a:r>
               <a:rPr lang="en-US" sz="2800" dirty="0">
                 <a:solidFill>
                   <a:srgbClr val="BA5536"/>
                 </a:solidFill>
                 <a:latin typeface="Gill Sans MT" panose="020B0502020104020203" pitchFamily="34" charset="0"/>
               </a:rPr>
-              <a:t>[insert answer]</a:t>
-            </a:r>
+              <a:t>to visualize them using </a:t>
+            </a:r>
+            <a:r>
+              <a:rPr lang="en-US" sz="2800" dirty="0" smtClean="0">
+                <a:solidFill>
+                  <a:srgbClr val="BA5536"/>
+                </a:solidFill>
+                <a:latin typeface="Gill Sans MT" panose="020B0502020104020203" pitchFamily="34" charset="0"/>
+              </a:rPr>
+              <a:t>flourish studio as we were not given any numerical columns</a:t>
+            </a:r>
+            <a:endParaRPr lang="en-US" sz="2800" dirty="0">
+              <a:solidFill>
+                <a:srgbClr val="BA5536"/>
+              </a:solidFill>
+              <a:latin typeface="Gill Sans MT" panose="020B0502020104020203" pitchFamily="34" charset="0"/>
+            </a:endParaRPr>
           </a:p>
           <a:p>
             <a:pPr marL="914400" lvl="1" indent="-457200">
@@ -6029,7 +6095,7 @@
           <p:cNvPr id="3" name="Picture 2">
             <a:extLst>
               <a:ext uri="{FF2B5EF4-FFF2-40B4-BE49-F238E27FC236}">
-                <a16:creationId xmlns:a16="http://schemas.microsoft.com/office/drawing/2014/main" xmlns="" id="{12E4DA0D-A9BC-49B7-ADD9-E087B2E8546B}"/>
+                <a16:creationId xmlns="" xmlns:a16="http://schemas.microsoft.com/office/drawing/2014/main" id="{12E4DA0D-A9BC-49B7-ADD9-E087B2E8546B}"/>
               </a:ext>
             </a:extLst>
           </p:cNvPr>
@@ -6100,7 +6166,7 @@
           <p:cNvPr id="2" name="Rectangle 1">
             <a:extLst>
               <a:ext uri="{FF2B5EF4-FFF2-40B4-BE49-F238E27FC236}">
-                <a16:creationId xmlns:a16="http://schemas.microsoft.com/office/drawing/2014/main" xmlns="" id="{A3AF13CD-9CA4-4571-852A-0303B145AD01}"/>
+                <a16:creationId xmlns="" xmlns:a16="http://schemas.microsoft.com/office/drawing/2014/main" id="{A3AF13CD-9CA4-4571-852A-0303B145AD01}"/>
               </a:ext>
             </a:extLst>
           </p:cNvPr>
@@ -6154,7 +6220,7 @@
           <p:cNvPr id="47" name="TextBox 46">
             <a:extLst>
               <a:ext uri="{FF2B5EF4-FFF2-40B4-BE49-F238E27FC236}">
-                <a16:creationId xmlns:a16="http://schemas.microsoft.com/office/drawing/2014/main" xmlns="" id="{B2164003-5AD3-4D73-81BC-411BB4361C50}"/>
+                <a16:creationId xmlns="" xmlns:a16="http://schemas.microsoft.com/office/drawing/2014/main" id="{B2164003-5AD3-4D73-81BC-411BB4361C50}"/>
               </a:ext>
             </a:extLst>
           </p:cNvPr>
@@ -6198,7 +6264,7 @@
           <p:cNvPr id="48" name="Straight Connector 47">
             <a:extLst>
               <a:ext uri="{FF2B5EF4-FFF2-40B4-BE49-F238E27FC236}">
-                <a16:creationId xmlns:a16="http://schemas.microsoft.com/office/drawing/2014/main" xmlns="" id="{C8536193-5CC5-45D9-92EA-40FAD17D0B6E}"/>
+                <a16:creationId xmlns="" xmlns:a16="http://schemas.microsoft.com/office/drawing/2014/main" id="{C8536193-5CC5-45D9-92EA-40FAD17D0B6E}"/>
               </a:ext>
             </a:extLst>
           </p:cNvPr>
@@ -6244,7 +6310,7 @@
           <p:cNvPr id="12" name="Straight Connector 11">
             <a:extLst>
               <a:ext uri="{FF2B5EF4-FFF2-40B4-BE49-F238E27FC236}">
-                <a16:creationId xmlns:a16="http://schemas.microsoft.com/office/drawing/2014/main" xmlns="" id="{AE4D85DC-2AF7-4524-AF7B-76C822BF8EF7}"/>
+                <a16:creationId xmlns="" xmlns:a16="http://schemas.microsoft.com/office/drawing/2014/main" id="{AE4D85DC-2AF7-4524-AF7B-76C822BF8EF7}"/>
               </a:ext>
             </a:extLst>
           </p:cNvPr>
@@ -6285,7 +6351,7 @@
           <p:cNvPr id="13" name="TextBox 12">
             <a:extLst>
               <a:ext uri="{FF2B5EF4-FFF2-40B4-BE49-F238E27FC236}">
-                <a16:creationId xmlns:a16="http://schemas.microsoft.com/office/drawing/2014/main" xmlns="" id="{8EE196A9-EE5D-4ED9-BAAE-E9F7F6336B6E}"/>
+                <a16:creationId xmlns="" xmlns:a16="http://schemas.microsoft.com/office/drawing/2014/main" id="{8EE196A9-EE5D-4ED9-BAAE-E9F7F6336B6E}"/>
               </a:ext>
             </a:extLst>
           </p:cNvPr>
@@ -6376,7 +6442,7 @@
           <p:cNvPr id="15" name="TextBox 14">
             <a:extLst>
               <a:ext uri="{FF2B5EF4-FFF2-40B4-BE49-F238E27FC236}">
-                <a16:creationId xmlns:a16="http://schemas.microsoft.com/office/drawing/2014/main" xmlns="" id="{F475EF02-C299-4E64-8C76-70D35420149D}"/>
+                <a16:creationId xmlns="" xmlns:a16="http://schemas.microsoft.com/office/drawing/2014/main" id="{F475EF02-C299-4E64-8C76-70D35420149D}"/>
               </a:ext>
             </a:extLst>
           </p:cNvPr>
@@ -6386,7 +6452,7 @@
         <p:spPr>
           <a:xfrm>
             <a:off x="3962399" y="6237863"/>
-            <a:ext cx="6248393" cy="2739211"/>
+            <a:ext cx="13716001" cy="4893647"/>
           </a:xfrm>
           <a:prstGeom prst="rect">
             <a:avLst/>
@@ -6412,14 +6478,20 @@
               <a:buChar char="o"/>
             </a:pPr>
             <a:r>
-              <a:rPr lang="en-US" sz="2800" dirty="0">
+              <a:rPr lang="en-US" sz="2800" dirty="0" smtClean="0">
                 <a:solidFill>
                   <a:srgbClr val="46211A"/>
                 </a:solidFill>
                 <a:latin typeface="Gill Sans MT" panose="020B0502020104020203" pitchFamily="34" charset="0"/>
               </a:rPr>
-              <a:t>[insert answer]</a:t>
-            </a:r>
+              <a:t>Looking where the volunteering resources are being used relative to where the people are volunteering from. This way we are able to see what countries deserve more projects. The other project I would consider is the amount of people volunteering on different topics. We will be able to see if any certain topics receive more volunteers than others. After that we will be able to explore why that is.</a:t>
+            </a:r>
+            <a:endParaRPr lang="en-US" sz="2800" dirty="0">
+              <a:solidFill>
+                <a:srgbClr val="BA5536"/>
+              </a:solidFill>
+              <a:latin typeface="Gill Sans MT" panose="020B0502020104020203" pitchFamily="34" charset="0"/>
+            </a:endParaRPr>
           </a:p>
           <a:p>
             <a:pPr marL="914400" lvl="1" indent="-457200">
@@ -6427,29 +6499,20 @@
               <a:buChar char="o"/>
             </a:pPr>
             <a:r>
-              <a:rPr lang="en-US" sz="2800" dirty="0">
+              <a:rPr lang="en-US" sz="2800" dirty="0" smtClean="0">
                 <a:solidFill>
                   <a:srgbClr val="BA5536"/>
                 </a:solidFill>
                 <a:latin typeface="Gill Sans MT" panose="020B0502020104020203" pitchFamily="34" charset="0"/>
               </a:rPr>
-              <a:t>[insert answer]</a:t>
-            </a:r>
-          </a:p>
-          <a:p>
-            <a:pPr marL="914400" lvl="1" indent="-457200">
-              <a:buFont typeface="Courier New" panose="02070309020205020404" pitchFamily="49" charset="0"/>
-              <a:buChar char="o"/>
-            </a:pPr>
-            <a:r>
-              <a:rPr lang="en-US" sz="2800" dirty="0">
-                <a:solidFill>
-                  <a:srgbClr val="BA5536"/>
-                </a:solidFill>
-                <a:latin typeface="Gill Sans MT" panose="020B0502020104020203" pitchFamily="34" charset="0"/>
-              </a:rPr>
-              <a:t>[insert answer]</a:t>
-            </a:r>
+              <a:t>I know the data will be able to give us counts for both of the questions. I think it will be more interesting to present the first idea. I will be considering pie charts, line graphs, bar charts, and other simple graphs to be able to get the message across quickly.</a:t>
+            </a:r>
+            <a:endParaRPr lang="en-US" sz="2800" dirty="0">
+              <a:solidFill>
+                <a:srgbClr val="BA5536"/>
+              </a:solidFill>
+              <a:latin typeface="Gill Sans MT" panose="020B0502020104020203" pitchFamily="34" charset="0"/>
+            </a:endParaRPr>
           </a:p>
           <a:p>
             <a:pPr marL="914400" lvl="1" indent="-457200">
@@ -6479,7 +6542,7 @@
           <p:cNvPr id="14" name="Group 13">
             <a:extLst>
               <a:ext uri="{FF2B5EF4-FFF2-40B4-BE49-F238E27FC236}">
-                <a16:creationId xmlns:a16="http://schemas.microsoft.com/office/drawing/2014/main" xmlns="" id="{1AFC6A42-A146-426D-AC59-2680C0CCECB3}"/>
+                <a16:creationId xmlns="" xmlns:a16="http://schemas.microsoft.com/office/drawing/2014/main" id="{1AFC6A42-A146-426D-AC59-2680C0CCECB3}"/>
               </a:ext>
             </a:extLst>
           </p:cNvPr>
@@ -6499,7 +6562,7 @@
             <p:cNvPr id="16" name="Picture 15">
               <a:extLst>
                 <a:ext uri="{FF2B5EF4-FFF2-40B4-BE49-F238E27FC236}">
-                  <a16:creationId xmlns:a16="http://schemas.microsoft.com/office/drawing/2014/main" xmlns="" id="{ECD62523-E992-477A-B64B-ECF4EFE7C014}"/>
+                  <a16:creationId xmlns="" xmlns:a16="http://schemas.microsoft.com/office/drawing/2014/main" id="{ECD62523-E992-477A-B64B-ECF4EFE7C014}"/>
                 </a:ext>
               </a:extLst>
             </p:cNvPr>
@@ -6539,7 +6602,7 @@
             <p:cNvPr id="17" name="Picture 16">
               <a:extLst>
                 <a:ext uri="{FF2B5EF4-FFF2-40B4-BE49-F238E27FC236}">
-                  <a16:creationId xmlns:a16="http://schemas.microsoft.com/office/drawing/2014/main" xmlns="" id="{2FD296EF-F3ED-4192-B047-CE3492D50FBD}"/>
+                  <a16:creationId xmlns="" xmlns:a16="http://schemas.microsoft.com/office/drawing/2014/main" id="{2FD296EF-F3ED-4192-B047-CE3492D50FBD}"/>
                 </a:ext>
               </a:extLst>
             </p:cNvPr>
@@ -6610,7 +6673,7 @@
           <p:cNvPr id="4" name="Rectangle 3">
             <a:extLst>
               <a:ext uri="{FF2B5EF4-FFF2-40B4-BE49-F238E27FC236}">
-                <a16:creationId xmlns:a16="http://schemas.microsoft.com/office/drawing/2014/main" xmlns="" id="{2A96683A-7560-4168-B30E-603A3A10D7A5}"/>
+                <a16:creationId xmlns="" xmlns:a16="http://schemas.microsoft.com/office/drawing/2014/main" id="{2A96683A-7560-4168-B30E-603A3A10D7A5}"/>
               </a:ext>
             </a:extLst>
           </p:cNvPr>
@@ -6664,7 +6727,7 @@
           <p:cNvPr id="47" name="TextBox 46">
             <a:extLst>
               <a:ext uri="{FF2B5EF4-FFF2-40B4-BE49-F238E27FC236}">
-                <a16:creationId xmlns:a16="http://schemas.microsoft.com/office/drawing/2014/main" xmlns="" id="{B2164003-5AD3-4D73-81BC-411BB4361C50}"/>
+                <a16:creationId xmlns="" xmlns:a16="http://schemas.microsoft.com/office/drawing/2014/main" id="{B2164003-5AD3-4D73-81BC-411BB4361C50}"/>
               </a:ext>
             </a:extLst>
           </p:cNvPr>
@@ -6738,7 +6801,7 @@
           <p:cNvPr id="48" name="Straight Connector 47">
             <a:extLst>
               <a:ext uri="{FF2B5EF4-FFF2-40B4-BE49-F238E27FC236}">
-                <a16:creationId xmlns:a16="http://schemas.microsoft.com/office/drawing/2014/main" xmlns="" id="{C8536193-5CC5-45D9-92EA-40FAD17D0B6E}"/>
+                <a16:creationId xmlns="" xmlns:a16="http://schemas.microsoft.com/office/drawing/2014/main" id="{C8536193-5CC5-45D9-92EA-40FAD17D0B6E}"/>
               </a:ext>
             </a:extLst>
           </p:cNvPr>
@@ -6784,7 +6847,7 @@
           <p:cNvPr id="12" name="Straight Connector 11">
             <a:extLst>
               <a:ext uri="{FF2B5EF4-FFF2-40B4-BE49-F238E27FC236}">
-                <a16:creationId xmlns:a16="http://schemas.microsoft.com/office/drawing/2014/main" xmlns="" id="{AE4D85DC-2AF7-4524-AF7B-76C822BF8EF7}"/>
+                <a16:creationId xmlns="" xmlns:a16="http://schemas.microsoft.com/office/drawing/2014/main" id="{AE4D85DC-2AF7-4524-AF7B-76C822BF8EF7}"/>
               </a:ext>
             </a:extLst>
           </p:cNvPr>
@@ -6825,7 +6888,7 @@
           <p:cNvPr id="13" name="TextBox 12">
             <a:extLst>
               <a:ext uri="{FF2B5EF4-FFF2-40B4-BE49-F238E27FC236}">
-                <a16:creationId xmlns:a16="http://schemas.microsoft.com/office/drawing/2014/main" xmlns="" id="{8EE196A9-EE5D-4ED9-BAAE-E9F7F6336B6E}"/>
+                <a16:creationId xmlns="" xmlns:a16="http://schemas.microsoft.com/office/drawing/2014/main" id="{8EE196A9-EE5D-4ED9-BAAE-E9F7F6336B6E}"/>
               </a:ext>
             </a:extLst>
           </p:cNvPr>
@@ -6901,7 +6964,7 @@
           <p:cNvPr id="15" name="TextBox 14">
             <a:extLst>
               <a:ext uri="{FF2B5EF4-FFF2-40B4-BE49-F238E27FC236}">
-                <a16:creationId xmlns:a16="http://schemas.microsoft.com/office/drawing/2014/main" xmlns="" id="{F475EF02-C299-4E64-8C76-70D35420149D}"/>
+                <a16:creationId xmlns="" xmlns:a16="http://schemas.microsoft.com/office/drawing/2014/main" id="{F475EF02-C299-4E64-8C76-70D35420149D}"/>
               </a:ext>
             </a:extLst>
           </p:cNvPr>
@@ -6911,7 +6974,7 @@
         <p:spPr>
           <a:xfrm>
             <a:off x="3962399" y="6237863"/>
-            <a:ext cx="6248393" cy="1877437"/>
+            <a:ext cx="7162801" cy="4462760"/>
           </a:xfrm>
           <a:prstGeom prst="rect">
             <a:avLst/>
@@ -6937,14 +7000,92 @@
               <a:buChar char="o"/>
             </a:pPr>
             <a:r>
+              <a:rPr lang="en-US" sz="2800" dirty="0" smtClean="0">
+                <a:solidFill>
+                  <a:srgbClr val="7D9CBA"/>
+                </a:solidFill>
+                <a:latin typeface="Gill Sans MT" panose="020B0502020104020203" pitchFamily="34" charset="0"/>
+              </a:rPr>
+              <a:t>Donut chart </a:t>
+            </a:r>
+            <a:r>
+              <a:rPr lang="en-US" sz="2800" dirty="0" smtClean="0">
+                <a:solidFill>
+                  <a:srgbClr val="7D9CBA"/>
+                </a:solidFill>
+                <a:latin typeface="Gill Sans MT" panose="020B0502020104020203" pitchFamily="34" charset="0"/>
+              </a:rPr>
+              <a:t>p</a:t>
+            </a:r>
+            <a:r>
+              <a:rPr lang="en-US" sz="2800" dirty="0" smtClean="0">
+                <a:solidFill>
+                  <a:srgbClr val="7D9CBA"/>
+                </a:solidFill>
+                <a:latin typeface="Gill Sans MT" panose="020B0502020104020203" pitchFamily="34" charset="0"/>
+              </a:rPr>
+              <a:t>ros:</a:t>
+            </a:r>
+          </a:p>
+          <a:p>
+            <a:pPr marL="1371600" lvl="2" indent="-457200">
+              <a:buFont typeface="Courier New" panose="02070309020205020404" pitchFamily="49" charset="0"/>
+              <a:buChar char="o"/>
+            </a:pPr>
+            <a:r>
               <a:rPr lang="en-US" sz="2800" dirty="0">
                 <a:solidFill>
                   <a:srgbClr val="7D9CBA"/>
                 </a:solidFill>
                 <a:latin typeface="Gill Sans MT" panose="020B0502020104020203" pitchFamily="34" charset="0"/>
               </a:rPr>
-              <a:t>[insert answer]</a:t>
-            </a:r>
+              <a:t>E</a:t>
+            </a:r>
+            <a:r>
+              <a:rPr lang="en-US" sz="2800" dirty="0" smtClean="0">
+                <a:solidFill>
+                  <a:srgbClr val="7D9CBA"/>
+                </a:solidFill>
+                <a:latin typeface="Gill Sans MT" panose="020B0502020104020203" pitchFamily="34" charset="0"/>
+              </a:rPr>
+              <a:t>asily digestible</a:t>
+            </a:r>
+          </a:p>
+          <a:p>
+            <a:pPr marL="1371600" lvl="2" indent="-457200">
+              <a:buFont typeface="Courier New" panose="02070309020205020404" pitchFamily="49" charset="0"/>
+              <a:buChar char="o"/>
+            </a:pPr>
+            <a:r>
+              <a:rPr lang="en-US" sz="2800" dirty="0" smtClean="0">
+                <a:solidFill>
+                  <a:srgbClr val="7D9CBA"/>
+                </a:solidFill>
+                <a:latin typeface="Gill Sans MT" panose="020B0502020104020203" pitchFamily="34" charset="0"/>
+              </a:rPr>
+              <a:t>Easy to look at</a:t>
+            </a:r>
+          </a:p>
+          <a:p>
+            <a:pPr marL="1371600" lvl="2" indent="-457200">
+              <a:buFont typeface="Courier New" panose="02070309020205020404" pitchFamily="49" charset="0"/>
+              <a:buChar char="o"/>
+            </a:pPr>
+            <a:r>
+              <a:rPr lang="en-US" sz="2800" dirty="0" smtClean="0">
+                <a:solidFill>
+                  <a:srgbClr val="7D9CBA"/>
+                </a:solidFill>
+                <a:latin typeface="Gill Sans MT" panose="020B0502020104020203" pitchFamily="34" charset="0"/>
+              </a:rPr>
+              <a:t>Simple</a:t>
+            </a:r>
+            <a:endParaRPr lang="en-US" sz="2800" dirty="0">
+              <a:solidFill>
+                <a:srgbClr val="7D9CBA"/>
+              </a:solidFill>
+              <a:latin typeface="Gill Sans MT" panose="020B0502020104020203" pitchFamily="34" charset="0"/>
+            </a:endParaRPr>
           </a:p>
           <a:p>
             <a:pPr marL="914400" lvl="1" indent="-457200">
@@ -6958,8 +7099,53 @@
                 </a:solidFill>
                 <a:latin typeface="Gill Sans MT" panose="020B0502020104020203" pitchFamily="34" charset="0"/>
               </a:rPr>
-              <a:t>[insert answer]</a:t>
-            </a:r>
+              <a:t>Donut</a:t>
+            </a:r>
+            <a:r>
+              <a:rPr lang="en-US" sz="2800" dirty="0" smtClean="0">
+                <a:solidFill>
+                  <a:srgbClr val="7D9CBA"/>
+                </a:solidFill>
+                <a:latin typeface="Gill Sans MT" panose="020B0502020104020203" pitchFamily="34" charset="0"/>
+              </a:rPr>
+              <a:t> chart cons:</a:t>
+            </a:r>
+          </a:p>
+          <a:p>
+            <a:pPr marL="1371600" lvl="2" indent="-457200">
+              <a:buFont typeface="Courier New" panose="02070309020205020404" pitchFamily="49" charset="0"/>
+              <a:buChar char="o"/>
+            </a:pPr>
+            <a:r>
+              <a:rPr lang="en-US" sz="2800" dirty="0" smtClean="0">
+                <a:solidFill>
+                  <a:srgbClr val="7D9CBA"/>
+                </a:solidFill>
+                <a:latin typeface="Gill Sans MT" panose="020B0502020104020203" pitchFamily="34" charset="0"/>
+              </a:rPr>
+              <a:t>Not able to display a ton of information</a:t>
+            </a:r>
+          </a:p>
+          <a:p>
+            <a:pPr marL="1371600" lvl="2" indent="-457200">
+              <a:buFont typeface="Courier New" panose="02070309020205020404" pitchFamily="49" charset="0"/>
+              <a:buChar char="o"/>
+            </a:pPr>
+            <a:r>
+              <a:rPr lang="en-US" sz="2800" dirty="0" smtClean="0">
+                <a:solidFill>
+                  <a:srgbClr val="7D9CBA"/>
+                </a:solidFill>
+                <a:latin typeface="Gill Sans MT" panose="020B0502020104020203" pitchFamily="34" charset="0"/>
+              </a:rPr>
+              <a:t>Need more than one to get the point</a:t>
+            </a:r>
+            <a:endParaRPr lang="en-US" sz="2800" dirty="0">
+              <a:solidFill>
+                <a:srgbClr val="7D9CBA"/>
+              </a:solidFill>
+              <a:latin typeface="Gill Sans MT" panose="020B0502020104020203" pitchFamily="34" charset="0"/>
+            </a:endParaRPr>
           </a:p>
           <a:p>
             <a:pPr marL="914400" lvl="1" indent="-457200">
@@ -6977,7 +7163,7 @@
           <p:cNvPr id="2" name="Picture 1">
             <a:extLst>
               <a:ext uri="{FF2B5EF4-FFF2-40B4-BE49-F238E27FC236}">
-                <a16:creationId xmlns:a16="http://schemas.microsoft.com/office/drawing/2014/main" xmlns="" id="{AB8C4458-37CD-409B-9B6B-A26B20E44E7C}"/>
+                <a16:creationId xmlns="" xmlns:a16="http://schemas.microsoft.com/office/drawing/2014/main" id="{AB8C4458-37CD-409B-9B6B-A26B20E44E7C}"/>
               </a:ext>
             </a:extLst>
           </p:cNvPr>
@@ -7013,6 +7199,202 @@
           </a:prstGeom>
         </p:spPr>
       </p:pic>
+      <p:sp>
+        <p:nvSpPr>
+          <p:cNvPr id="9" name="TextBox 8">
+            <a:extLst>
+              <a:ext uri="{FF2B5EF4-FFF2-40B4-BE49-F238E27FC236}">
+                <a16:creationId xmlns="" xmlns:a16="http://schemas.microsoft.com/office/drawing/2014/main" id="{F475EF02-C299-4E64-8C76-70D35420149D}"/>
+              </a:ext>
+            </a:extLst>
+          </p:cNvPr>
+          <p:cNvSpPr txBox="1"/>
+          <p:nvPr/>
+        </p:nvSpPr>
+        <p:spPr>
+          <a:xfrm>
+            <a:off x="10515600" y="6237863"/>
+            <a:ext cx="7162801" cy="4462760"/>
+          </a:xfrm>
+          <a:prstGeom prst="rect">
+            <a:avLst/>
+          </a:prstGeom>
+          <a:noFill/>
+        </p:spPr>
+        <p:txBody>
+          <a:bodyPr wrap="square" rtlCol="0">
+            <a:spAutoFit/>
+          </a:bodyPr>
+          <a:lstStyle/>
+          <a:p>
+            <a:endParaRPr lang="en-US" sz="3200" b="1" dirty="0">
+              <a:latin typeface="Gill Sans MT" panose="020B0502020104020203" pitchFamily="34" charset="0"/>
+            </a:endParaRPr>
+          </a:p>
+          <a:p>
+            <a:pPr marL="914400" lvl="1" indent="-457200">
+              <a:buFont typeface="Courier New" panose="02070309020205020404" pitchFamily="49" charset="0"/>
+              <a:buChar char="o"/>
+            </a:pPr>
+            <a:r>
+              <a:rPr lang="en-US" sz="2800" dirty="0" smtClean="0">
+                <a:solidFill>
+                  <a:srgbClr val="7D9CBA"/>
+                </a:solidFill>
+                <a:latin typeface="Gill Sans MT" panose="020B0502020104020203" pitchFamily="34" charset="0"/>
+              </a:rPr>
+              <a:t>Line graph</a:t>
+            </a:r>
+            <a:r>
+              <a:rPr lang="en-US" sz="2800" dirty="0" smtClean="0">
+                <a:solidFill>
+                  <a:srgbClr val="7D9CBA"/>
+                </a:solidFill>
+                <a:latin typeface="Gill Sans MT" panose="020B0502020104020203" pitchFamily="34" charset="0"/>
+              </a:rPr>
+              <a:t> </a:t>
+            </a:r>
+            <a:r>
+              <a:rPr lang="en-US" sz="2800" dirty="0" smtClean="0">
+                <a:solidFill>
+                  <a:srgbClr val="7D9CBA"/>
+                </a:solidFill>
+                <a:latin typeface="Gill Sans MT" panose="020B0502020104020203" pitchFamily="34" charset="0"/>
+              </a:rPr>
+              <a:t>p</a:t>
+            </a:r>
+            <a:r>
+              <a:rPr lang="en-US" sz="2800" dirty="0" smtClean="0">
+                <a:solidFill>
+                  <a:srgbClr val="7D9CBA"/>
+                </a:solidFill>
+                <a:latin typeface="Gill Sans MT" panose="020B0502020104020203" pitchFamily="34" charset="0"/>
+              </a:rPr>
+              <a:t>ros:</a:t>
+            </a:r>
+          </a:p>
+          <a:p>
+            <a:pPr marL="1371600" lvl="2" indent="-457200">
+              <a:buFont typeface="Courier New" panose="02070309020205020404" pitchFamily="49" charset="0"/>
+              <a:buChar char="o"/>
+            </a:pPr>
+            <a:r>
+              <a:rPr lang="en-US" sz="2800" dirty="0">
+                <a:solidFill>
+                  <a:srgbClr val="7D9CBA"/>
+                </a:solidFill>
+                <a:latin typeface="Gill Sans MT" panose="020B0502020104020203" pitchFamily="34" charset="0"/>
+              </a:rPr>
+              <a:t>E</a:t>
+            </a:r>
+            <a:r>
+              <a:rPr lang="en-US" sz="2800" dirty="0" smtClean="0">
+                <a:solidFill>
+                  <a:srgbClr val="7D9CBA"/>
+                </a:solidFill>
+                <a:latin typeface="Gill Sans MT" panose="020B0502020104020203" pitchFamily="34" charset="0"/>
+              </a:rPr>
+              <a:t>asily digestible</a:t>
+            </a:r>
+          </a:p>
+          <a:p>
+            <a:pPr marL="1371600" lvl="2" indent="-457200">
+              <a:buFont typeface="Courier New" panose="02070309020205020404" pitchFamily="49" charset="0"/>
+              <a:buChar char="o"/>
+            </a:pPr>
+            <a:r>
+              <a:rPr lang="en-US" sz="2800" dirty="0" smtClean="0">
+                <a:solidFill>
+                  <a:srgbClr val="7D9CBA"/>
+                </a:solidFill>
+                <a:latin typeface="Gill Sans MT" panose="020B0502020104020203" pitchFamily="34" charset="0"/>
+              </a:rPr>
+              <a:t>Easy to look at</a:t>
+            </a:r>
+          </a:p>
+          <a:p>
+            <a:pPr marL="1371600" lvl="2" indent="-457200">
+              <a:buFont typeface="Courier New" panose="02070309020205020404" pitchFamily="49" charset="0"/>
+              <a:buChar char="o"/>
+            </a:pPr>
+            <a:r>
+              <a:rPr lang="en-US" sz="2800" dirty="0" smtClean="0">
+                <a:solidFill>
+                  <a:srgbClr val="7D9CBA"/>
+                </a:solidFill>
+                <a:latin typeface="Gill Sans MT" panose="020B0502020104020203" pitchFamily="34" charset="0"/>
+              </a:rPr>
+              <a:t>Simple</a:t>
+            </a:r>
+            <a:endParaRPr lang="en-US" sz="2800" dirty="0">
+              <a:solidFill>
+                <a:srgbClr val="7D9CBA"/>
+              </a:solidFill>
+              <a:latin typeface="Gill Sans MT" panose="020B0502020104020203" pitchFamily="34" charset="0"/>
+            </a:endParaRPr>
+          </a:p>
+          <a:p>
+            <a:pPr marL="914400" lvl="1" indent="-457200">
+              <a:buFont typeface="Courier New" panose="02070309020205020404" pitchFamily="49" charset="0"/>
+              <a:buChar char="o"/>
+            </a:pPr>
+            <a:r>
+              <a:rPr lang="en-US" sz="2800" dirty="0" smtClean="0">
+                <a:solidFill>
+                  <a:srgbClr val="7D9CBA"/>
+                </a:solidFill>
+                <a:latin typeface="Gill Sans MT" panose="020B0502020104020203" pitchFamily="34" charset="0"/>
+              </a:rPr>
+              <a:t>Line graph cons:</a:t>
+            </a:r>
+          </a:p>
+          <a:p>
+            <a:pPr marL="1371600" lvl="2" indent="-457200">
+              <a:buFont typeface="Courier New" panose="02070309020205020404" pitchFamily="49" charset="0"/>
+              <a:buChar char="o"/>
+            </a:pPr>
+            <a:r>
+              <a:rPr lang="en-US" sz="2800" dirty="0" smtClean="0">
+                <a:solidFill>
+                  <a:srgbClr val="7D9CBA"/>
+                </a:solidFill>
+                <a:latin typeface="Gill Sans MT" panose="020B0502020104020203" pitchFamily="34" charset="0"/>
+              </a:rPr>
+              <a:t>Not a ton of information to display in this case</a:t>
+            </a:r>
+          </a:p>
+          <a:p>
+            <a:pPr marL="1371600" lvl="2" indent="-457200">
+              <a:buFont typeface="Courier New" panose="02070309020205020404" pitchFamily="49" charset="0"/>
+              <a:buChar char="o"/>
+            </a:pPr>
+            <a:r>
+              <a:rPr lang="en-US" sz="2800" dirty="0" smtClean="0">
+                <a:solidFill>
+                  <a:srgbClr val="7D9CBA"/>
+                </a:solidFill>
+                <a:latin typeface="Gill Sans MT" panose="020B0502020104020203" pitchFamily="34" charset="0"/>
+              </a:rPr>
+              <a:t>Need more data to see longer trends</a:t>
+            </a:r>
+            <a:endParaRPr lang="en-US" sz="2800" dirty="0">
+              <a:solidFill>
+                <a:srgbClr val="7D9CBA"/>
+              </a:solidFill>
+              <a:latin typeface="Gill Sans MT" panose="020B0502020104020203" pitchFamily="34" charset="0"/>
+            </a:endParaRPr>
+          </a:p>
+          <a:p>
+            <a:pPr marL="914400" lvl="1" indent="-457200">
+              <a:buFont typeface="Courier New" panose="02070309020205020404" pitchFamily="49" charset="0"/>
+              <a:buChar char="o"/>
+            </a:pPr>
+            <a:endParaRPr lang="en-US" sz="2800" dirty="0">
+              <a:latin typeface="Gill Sans MT" panose="020B0502020104020203" pitchFamily="34" charset="0"/>
+            </a:endParaRPr>
+          </a:p>
+        </p:txBody>
+      </p:sp>
     </p:spTree>
     <p:extLst>
       <p:ext uri="{BB962C8B-B14F-4D97-AF65-F5344CB8AC3E}">
@@ -7048,7 +7430,7 @@
           <p:cNvPr id="4" name="Rectangle 3">
             <a:extLst>
               <a:ext uri="{FF2B5EF4-FFF2-40B4-BE49-F238E27FC236}">
-                <a16:creationId xmlns:a16="http://schemas.microsoft.com/office/drawing/2014/main" xmlns="" id="{2A96683A-7560-4168-B30E-603A3A10D7A5}"/>
+                <a16:creationId xmlns="" xmlns:a16="http://schemas.microsoft.com/office/drawing/2014/main" id="{2A96683A-7560-4168-B30E-603A3A10D7A5}"/>
               </a:ext>
             </a:extLst>
           </p:cNvPr>
@@ -7102,7 +7484,7 @@
           <p:cNvPr id="47" name="TextBox 46">
             <a:extLst>
               <a:ext uri="{FF2B5EF4-FFF2-40B4-BE49-F238E27FC236}">
-                <a16:creationId xmlns:a16="http://schemas.microsoft.com/office/drawing/2014/main" xmlns="" id="{B2164003-5AD3-4D73-81BC-411BB4361C50}"/>
+                <a16:creationId xmlns="" xmlns:a16="http://schemas.microsoft.com/office/drawing/2014/main" id="{B2164003-5AD3-4D73-81BC-411BB4361C50}"/>
               </a:ext>
             </a:extLst>
           </p:cNvPr>
@@ -7146,7 +7528,7 @@
           <p:cNvPr id="48" name="Straight Connector 47">
             <a:extLst>
               <a:ext uri="{FF2B5EF4-FFF2-40B4-BE49-F238E27FC236}">
-                <a16:creationId xmlns:a16="http://schemas.microsoft.com/office/drawing/2014/main" xmlns="" id="{C8536193-5CC5-45D9-92EA-40FAD17D0B6E}"/>
+                <a16:creationId xmlns="" xmlns:a16="http://schemas.microsoft.com/office/drawing/2014/main" id="{C8536193-5CC5-45D9-92EA-40FAD17D0B6E}"/>
               </a:ext>
             </a:extLst>
           </p:cNvPr>
@@ -7192,7 +7574,7 @@
           <p:cNvPr id="12" name="Straight Connector 11">
             <a:extLst>
               <a:ext uri="{FF2B5EF4-FFF2-40B4-BE49-F238E27FC236}">
-                <a16:creationId xmlns:a16="http://schemas.microsoft.com/office/drawing/2014/main" xmlns="" id="{AE4D85DC-2AF7-4524-AF7B-76C822BF8EF7}"/>
+                <a16:creationId xmlns="" xmlns:a16="http://schemas.microsoft.com/office/drawing/2014/main" id="{AE4D85DC-2AF7-4524-AF7B-76C822BF8EF7}"/>
               </a:ext>
             </a:extLst>
           </p:cNvPr>
@@ -7233,7 +7615,7 @@
           <p:cNvPr id="13" name="TextBox 12">
             <a:extLst>
               <a:ext uri="{FF2B5EF4-FFF2-40B4-BE49-F238E27FC236}">
-                <a16:creationId xmlns:a16="http://schemas.microsoft.com/office/drawing/2014/main" xmlns="" id="{8EE196A9-EE5D-4ED9-BAAE-E9F7F6336B6E}"/>
+                <a16:creationId xmlns="" xmlns:a16="http://schemas.microsoft.com/office/drawing/2014/main" id="{8EE196A9-EE5D-4ED9-BAAE-E9F7F6336B6E}"/>
               </a:ext>
             </a:extLst>
           </p:cNvPr>
@@ -7339,7 +7721,7 @@
           <p:cNvPr id="15" name="TextBox 14">
             <a:extLst>
               <a:ext uri="{FF2B5EF4-FFF2-40B4-BE49-F238E27FC236}">
-                <a16:creationId xmlns:a16="http://schemas.microsoft.com/office/drawing/2014/main" xmlns="" id="{F475EF02-C299-4E64-8C76-70D35420149D}"/>
+                <a16:creationId xmlns="" xmlns:a16="http://schemas.microsoft.com/office/drawing/2014/main" id="{F475EF02-C299-4E64-8C76-70D35420149D}"/>
               </a:ext>
             </a:extLst>
           </p:cNvPr>
@@ -7349,7 +7731,7 @@
         <p:spPr>
           <a:xfrm>
             <a:off x="3962399" y="6237863"/>
-            <a:ext cx="6248393" cy="2739211"/>
+            <a:ext cx="13335001" cy="4893647"/>
           </a:xfrm>
           <a:prstGeom prst="rect">
             <a:avLst/>
@@ -7375,14 +7757,35 @@
               <a:buChar char="o"/>
             </a:pPr>
             <a:r>
-              <a:rPr lang="en-US" sz="2800" dirty="0">
+              <a:rPr lang="en-US" sz="2800" dirty="0" smtClean="0">
                 <a:solidFill>
                   <a:srgbClr val="7D9CBA"/>
                 </a:solidFill>
                 <a:latin typeface="Gill Sans MT" panose="020B0502020104020203" pitchFamily="34" charset="0"/>
               </a:rPr>
-              <a:t>[insert answer]</a:t>
-            </a:r>
+              <a:t>Feedback 1:</a:t>
+            </a:r>
+          </a:p>
+          <a:p>
+            <a:pPr marL="1371600" lvl="2" indent="-457200">
+              <a:buFont typeface="Courier New" panose="02070309020205020404" pitchFamily="49" charset="0"/>
+              <a:buChar char="o"/>
+            </a:pPr>
+            <a:r>
+              <a:rPr lang="en-US" sz="2800" dirty="0" smtClean="0">
+                <a:solidFill>
+                  <a:srgbClr val="7D9CBA"/>
+                </a:solidFill>
+                <a:latin typeface="Gill Sans MT" panose="020B0502020104020203" pitchFamily="34" charset="0"/>
+              </a:rPr>
+              <a:t>“The story is very clear and easy to understand. It took me 3 seconds per graph to see what was happening. The formatting of the graph helps in making it digestible. One suggestion I have would be to order the categories to make it even faster to determine rank order.</a:t>
+            </a:r>
+            <a:endParaRPr lang="en-US" sz="2800" dirty="0">
+              <a:solidFill>
+                <a:srgbClr val="7D9CBA"/>
+              </a:solidFill>
+              <a:latin typeface="Gill Sans MT" panose="020B0502020104020203" pitchFamily="34" charset="0"/>
+            </a:endParaRPr>
           </a:p>
           <a:p>
             <a:pPr marL="914400" lvl="1" indent="-457200">
@@ -7390,29 +7793,35 @@
               <a:buChar char="o"/>
             </a:pPr>
             <a:r>
-              <a:rPr lang="en-US" sz="2800" dirty="0">
+              <a:rPr lang="en-US" sz="2800" dirty="0" smtClean="0">
                 <a:solidFill>
                   <a:srgbClr val="7D9CBA"/>
                 </a:solidFill>
                 <a:latin typeface="Gill Sans MT" panose="020B0502020104020203" pitchFamily="34" charset="0"/>
               </a:rPr>
-              <a:t>[insert answer]</a:t>
-            </a:r>
-          </a:p>
-          <a:p>
-            <a:pPr marL="914400" lvl="1" indent="-457200">
+              <a:t>Feedback 2:</a:t>
+            </a:r>
+          </a:p>
+          <a:p>
+            <a:pPr marL="1371600" lvl="2" indent="-457200">
               <a:buFont typeface="Courier New" panose="02070309020205020404" pitchFamily="49" charset="0"/>
               <a:buChar char="o"/>
             </a:pPr>
             <a:r>
-              <a:rPr lang="en-US" sz="2800" dirty="0">
+              <a:rPr lang="en-US" sz="2800" dirty="0" smtClean="0">
                 <a:solidFill>
                   <a:srgbClr val="7D9CBA"/>
                 </a:solidFill>
                 <a:latin typeface="Gill Sans MT" panose="020B0502020104020203" pitchFamily="34" charset="0"/>
               </a:rPr>
-              <a:t>[insert answer]</a:t>
-            </a:r>
+              <a:t>“I have the same thoughts as the last feedback, thank you for making the graph ordered, it makes it even easier to read now. I have no further suggestions.”</a:t>
+            </a:r>
+            <a:endParaRPr lang="en-US" sz="2800" dirty="0">
+              <a:solidFill>
+                <a:srgbClr val="7D9CBA"/>
+              </a:solidFill>
+              <a:latin typeface="Gill Sans MT" panose="020B0502020104020203" pitchFamily="34" charset="0"/>
+            </a:endParaRPr>
           </a:p>
           <a:p>
             <a:pPr marL="914400" lvl="1" indent="-457200">
@@ -7442,7 +7851,7 @@
           <p:cNvPr id="2" name="Picture 1">
             <a:extLst>
               <a:ext uri="{FF2B5EF4-FFF2-40B4-BE49-F238E27FC236}">
-                <a16:creationId xmlns:a16="http://schemas.microsoft.com/office/drawing/2014/main" xmlns="" id="{AB8C4458-37CD-409B-9B6B-A26B20E44E7C}"/>
+                <a16:creationId xmlns="" xmlns:a16="http://schemas.microsoft.com/office/drawing/2014/main" id="{AB8C4458-37CD-409B-9B6B-A26B20E44E7C}"/>
               </a:ext>
             </a:extLst>
           </p:cNvPr>

</xml_diff>